<commit_message>
Update the power point presentation
</commit_message>
<xml_diff>
--- a/Smart Neighborhood.pptx
+++ b/Smart Neighborhood.pptx
@@ -22,15 +22,16 @@
     <p:sldId id="283" r:id="rId16"/>
     <p:sldId id="276" r:id="rId17"/>
     <p:sldId id="277" r:id="rId18"/>
-    <p:sldId id="279" r:id="rId19"/>
-    <p:sldId id="263" r:id="rId20"/>
-    <p:sldId id="272" r:id="rId21"/>
-    <p:sldId id="269" r:id="rId22"/>
-    <p:sldId id="270" r:id="rId23"/>
-    <p:sldId id="271" r:id="rId24"/>
-    <p:sldId id="273" r:id="rId25"/>
-    <p:sldId id="274" r:id="rId26"/>
-    <p:sldId id="264" r:id="rId27"/>
+    <p:sldId id="284" r:id="rId19"/>
+    <p:sldId id="279" r:id="rId20"/>
+    <p:sldId id="263" r:id="rId21"/>
+    <p:sldId id="272" r:id="rId22"/>
+    <p:sldId id="269" r:id="rId23"/>
+    <p:sldId id="270" r:id="rId24"/>
+    <p:sldId id="271" r:id="rId25"/>
+    <p:sldId id="273" r:id="rId26"/>
+    <p:sldId id="274" r:id="rId27"/>
+    <p:sldId id="264" r:id="rId28"/>
   </p:sldIdLst>
   <p:sldSz cx="12192000" cy="6858000"/>
   <p:notesSz cx="6858000" cy="9144000"/>
@@ -363,7 +364,7 @@
           <a:p>
             <a:fld id="{8BE6B674-AADE-49EF-9780-6CBE5B9EDB57}" type="datetimeFigureOut">
               <a:rPr lang="en-GB" smtClean="0"/>
-              <a:t>08/04/2022</a:t>
+              <a:t>14/04/2022</a:t>
             </a:fld>
             <a:endParaRPr lang="en-GB"/>
           </a:p>
@@ -571,7 +572,7 @@
           <a:p>
             <a:fld id="{8BE6B674-AADE-49EF-9780-6CBE5B9EDB57}" type="datetimeFigureOut">
               <a:rPr lang="en-GB" smtClean="0"/>
-              <a:t>08/04/2022</a:t>
+              <a:t>14/04/2022</a:t>
             </a:fld>
             <a:endParaRPr lang="en-GB"/>
           </a:p>
@@ -827,7 +828,7 @@
           <a:p>
             <a:fld id="{8BE6B674-AADE-49EF-9780-6CBE5B9EDB57}" type="datetimeFigureOut">
               <a:rPr lang="en-GB" smtClean="0"/>
-              <a:t>08/04/2022</a:t>
+              <a:t>14/04/2022</a:t>
             </a:fld>
             <a:endParaRPr lang="en-GB"/>
           </a:p>
@@ -1001,7 +1002,7 @@
           <a:p>
             <a:fld id="{8BE6B674-AADE-49EF-9780-6CBE5B9EDB57}" type="datetimeFigureOut">
               <a:rPr lang="en-GB" smtClean="0"/>
-              <a:t>08/04/2022</a:t>
+              <a:t>14/04/2022</a:t>
             </a:fld>
             <a:endParaRPr lang="en-GB"/>
           </a:p>
@@ -1344,7 +1345,7 @@
           <a:p>
             <a:fld id="{8BE6B674-AADE-49EF-9780-6CBE5B9EDB57}" type="datetimeFigureOut">
               <a:rPr lang="en-GB" smtClean="0"/>
-              <a:t>08/04/2022</a:t>
+              <a:t>14/04/2022</a:t>
             </a:fld>
             <a:endParaRPr lang="en-GB"/>
           </a:p>
@@ -1619,7 +1620,7 @@
           <a:p>
             <a:fld id="{8BE6B674-AADE-49EF-9780-6CBE5B9EDB57}" type="datetimeFigureOut">
               <a:rPr lang="en-GB" smtClean="0"/>
-              <a:t>08/04/2022</a:t>
+              <a:t>14/04/2022</a:t>
             </a:fld>
             <a:endParaRPr lang="en-GB"/>
           </a:p>
@@ -1998,7 +1999,7 @@
           <a:p>
             <a:fld id="{8BE6B674-AADE-49EF-9780-6CBE5B9EDB57}" type="datetimeFigureOut">
               <a:rPr lang="en-GB" smtClean="0"/>
-              <a:t>08/04/2022</a:t>
+              <a:t>14/04/2022</a:t>
             </a:fld>
             <a:endParaRPr lang="en-GB"/>
           </a:p>
@@ -2116,7 +2117,7 @@
           <a:p>
             <a:fld id="{8BE6B674-AADE-49EF-9780-6CBE5B9EDB57}" type="datetimeFigureOut">
               <a:rPr lang="en-GB" smtClean="0"/>
-              <a:t>08/04/2022</a:t>
+              <a:t>14/04/2022</a:t>
             </a:fld>
             <a:endParaRPr lang="en-GB"/>
           </a:p>
@@ -2287,7 +2288,7 @@
           <a:p>
             <a:fld id="{8BE6B674-AADE-49EF-9780-6CBE5B9EDB57}" type="datetimeFigureOut">
               <a:rPr lang="en-GB" smtClean="0"/>
-              <a:t>08/04/2022</a:t>
+              <a:t>14/04/2022</a:t>
             </a:fld>
             <a:endParaRPr lang="en-GB"/>
           </a:p>
@@ -2641,7 +2642,7 @@
           <a:p>
             <a:fld id="{8BE6B674-AADE-49EF-9780-6CBE5B9EDB57}" type="datetimeFigureOut">
               <a:rPr lang="en-GB" smtClean="0"/>
-              <a:t>08/04/2022</a:t>
+              <a:t>14/04/2022</a:t>
             </a:fld>
             <a:endParaRPr lang="en-GB"/>
           </a:p>
@@ -3023,7 +3024,7 @@
           <a:p>
             <a:fld id="{8BE6B674-AADE-49EF-9780-6CBE5B9EDB57}" type="datetimeFigureOut">
               <a:rPr lang="en-GB" smtClean="0"/>
-              <a:t>08/04/2022</a:t>
+              <a:t>14/04/2022</a:t>
             </a:fld>
             <a:endParaRPr lang="en-GB"/>
           </a:p>
@@ -3310,7 +3311,7 @@
           <a:p>
             <a:fld id="{8BE6B674-AADE-49EF-9780-6CBE5B9EDB57}" type="datetimeFigureOut">
               <a:rPr lang="en-GB" smtClean="0"/>
-              <a:t>08/04/2022</a:t>
+              <a:t>14/04/2022</a:t>
             </a:fld>
             <a:endParaRPr lang="en-GB"/>
           </a:p>
@@ -7234,35 +7235,42 @@
           </a:p>
         </p:txBody>
       </p:sp>
-      <p:sp>
-        <p:nvSpPr>
-          <p:cNvPr id="3" name="Segnaposto contenuto 2">
+      <p:pic>
+        <p:nvPicPr>
+          <p:cNvPr id="5" name="Picture 4">
             <a:extLst>
               <a:ext uri="{FF2B5EF4-FFF2-40B4-BE49-F238E27FC236}">
-                <a16:creationId xmlns:a16="http://schemas.microsoft.com/office/drawing/2014/main" id="{B4DB2530-61AC-44AC-9CE9-85251E23B809}"/>
+                <a16:creationId xmlns:a16="http://schemas.microsoft.com/office/drawing/2014/main" id="{3969D7CF-9C48-0FAE-BE13-77B663A33820}"/>
               </a:ext>
             </a:extLst>
           </p:cNvPr>
-          <p:cNvSpPr>
-            <a:spLocks noGrp="1"/>
-          </p:cNvSpPr>
-          <p:nvPr>
-            <p:ph idx="1"/>
-          </p:nvPr>
-        </p:nvSpPr>
-        <p:spPr/>
-        <p:txBody>
-          <a:bodyPr/>
-          <a:lstStyle/>
-          <a:p>
-            <a:r>
-              <a:rPr lang="it-IT" dirty="0" err="1"/>
-              <a:t>Structure</a:t>
-            </a:r>
-            <a:endParaRPr lang="en-GB" dirty="0"/>
-          </a:p>
-        </p:txBody>
-      </p:sp>
+          <p:cNvPicPr>
+            <a:picLocks noChangeAspect="1"/>
+          </p:cNvPicPr>
+          <p:nvPr/>
+        </p:nvPicPr>
+        <p:blipFill>
+          <a:blip r:embed="rId2">
+            <a:extLst>
+              <a:ext uri="{28A0092B-C50C-407E-A947-70E740481C1C}">
+                <a14:useLocalDpi xmlns:a14="http://schemas.microsoft.com/office/drawing/2010/main" val="0"/>
+              </a:ext>
+            </a:extLst>
+          </a:blip>
+          <a:stretch>
+            <a:fillRect/>
+          </a:stretch>
+        </p:blipFill>
+        <p:spPr>
+          <a:xfrm>
+            <a:off x="1819656" y="1947671"/>
+            <a:ext cx="7891076" cy="3577499"/>
+          </a:xfrm>
+          <a:prstGeom prst="rect">
+            <a:avLst/>
+          </a:prstGeom>
+        </p:spPr>
+      </p:pic>
     </p:spTree>
     <p:extLst>
       <p:ext uri="{BB962C8B-B14F-4D97-AF65-F5344CB8AC3E}">
@@ -7298,7 +7306,7 @@
           <p:cNvPr id="2" name="Titolo 1">
             <a:extLst>
               <a:ext uri="{FF2B5EF4-FFF2-40B4-BE49-F238E27FC236}">
-                <a16:creationId xmlns:a16="http://schemas.microsoft.com/office/drawing/2014/main" id="{00C2A123-0917-441F-A181-BA0AD5570E29}"/>
+                <a16:creationId xmlns:a16="http://schemas.microsoft.com/office/drawing/2014/main" id="{CD615654-B50B-4C0E-A230-FEABB50A2831}"/>
               </a:ext>
             </a:extLst>
           </p:cNvPr>
@@ -7315,16 +7323,8 @@
           <a:lstStyle/>
           <a:p>
             <a:r>
-              <a:rPr lang="it-IT" dirty="0" err="1"/>
-              <a:t>OpenWeather</a:t>
-            </a:r>
-            <a:r>
               <a:rPr lang="it-IT" dirty="0"/>
-              <a:t> </a:t>
-            </a:r>
-            <a:r>
-              <a:rPr lang="it-IT" dirty="0" err="1"/>
-              <a:t>codes</a:t>
+              <a:t>DB SqLite3 (1)</a:t>
             </a:r>
             <a:endParaRPr lang="en-GB" dirty="0"/>
           </a:p>
@@ -7332,33 +7332,188 @@
       </p:sp>
       <p:sp>
         <p:nvSpPr>
-          <p:cNvPr id="3" name="Segnaposto contenuto 2">
+          <p:cNvPr id="6" name="TextBox 5">
             <a:extLst>
               <a:ext uri="{FF2B5EF4-FFF2-40B4-BE49-F238E27FC236}">
-                <a16:creationId xmlns:a16="http://schemas.microsoft.com/office/drawing/2014/main" id="{DFDF4A4E-5ADE-494E-ABB5-7DC693692AD8}"/>
+                <a16:creationId xmlns:a16="http://schemas.microsoft.com/office/drawing/2014/main" id="{91D065EC-2922-7928-2099-298CEF6CC736}"/>
               </a:ext>
             </a:extLst>
           </p:cNvPr>
-          <p:cNvSpPr>
-            <a:spLocks noGrp="1"/>
-          </p:cNvSpPr>
-          <p:nvPr>
-            <p:ph idx="1"/>
-          </p:nvPr>
-        </p:nvSpPr>
-        <p:spPr/>
+          <p:cNvSpPr txBox="1"/>
+          <p:nvPr/>
+        </p:nvSpPr>
+        <p:spPr>
+          <a:xfrm>
+            <a:off x="1243584" y="2029968"/>
+            <a:ext cx="9912096" cy="3970318"/>
+          </a:xfrm>
+          <a:prstGeom prst="rect">
+            <a:avLst/>
+          </a:prstGeom>
+          <a:noFill/>
+        </p:spPr>
         <p:txBody>
-          <a:bodyPr/>
+          <a:bodyPr wrap="square" rtlCol="0">
+            <a:spAutoFit/>
+          </a:bodyPr>
           <a:lstStyle/>
           <a:p>
-            <a:endParaRPr lang="en-GB"/>
+            <a:r>
+              <a:rPr lang="en-IT" dirty="0"/>
+              <a:t>The database is managed automatically by Django using the model part of the MVC approach: we define a python class for each table of the db and Django creates the respective relational db. The 4 classes are described below:</a:t>
+            </a:r>
+          </a:p>
+          <a:p>
+            <a:pPr marL="285750" indent="-285750">
+              <a:buFont typeface="Arial" panose="020B0604020202020204" pitchFamily="34" charset="0"/>
+              <a:buChar char="•"/>
+            </a:pPr>
+            <a:r>
+              <a:rPr lang="en-IT" b="1" dirty="0"/>
+              <a:t>ChatTelegram: </a:t>
+            </a:r>
+            <a:r>
+              <a:rPr lang="en-IT" dirty="0"/>
+              <a:t>represents a chat telegram of users identified by the </a:t>
+            </a:r>
+            <a:r>
+              <a:rPr lang="en-IT" i="1" dirty="0"/>
+              <a:t>chat_id</a:t>
+            </a:r>
+            <a:r>
+              <a:rPr lang="en-IT" dirty="0"/>
+              <a:t>;</a:t>
+            </a:r>
+          </a:p>
+          <a:p>
+            <a:pPr marL="285750" indent="-285750">
+              <a:buFont typeface="Arial" panose="020B0604020202020204" pitchFamily="34" charset="0"/>
+              <a:buChar char="•"/>
+            </a:pPr>
+            <a:r>
+              <a:rPr lang="en-IT" b="1" dirty="0"/>
+              <a:t>User: </a:t>
+            </a:r>
+            <a:r>
+              <a:rPr lang="en-IT" dirty="0"/>
+              <a:t>represent a user of the system and it’s the class managed automatically by the Django authentication system, it has a unique </a:t>
+            </a:r>
+            <a:r>
+              <a:rPr lang="en-IT" i="1" dirty="0"/>
+              <a:t>email </a:t>
+            </a:r>
+            <a:r>
+              <a:rPr lang="en-IT" dirty="0"/>
+              <a:t>and a</a:t>
+            </a:r>
+            <a:r>
+              <a:rPr lang="en-IT" i="1" dirty="0"/>
+              <a:t> password</a:t>
+            </a:r>
+            <a:r>
+              <a:rPr lang="en-IT" dirty="0"/>
+              <a:t>;</a:t>
+            </a:r>
+          </a:p>
+          <a:p>
+            <a:pPr marL="285750" indent="-285750">
+              <a:buFont typeface="Arial" panose="020B0604020202020204" pitchFamily="34" charset="0"/>
+              <a:buChar char="•"/>
+            </a:pPr>
+            <a:r>
+              <a:rPr lang="en-IT" b="1" dirty="0"/>
+              <a:t>House: </a:t>
+            </a:r>
+            <a:r>
+              <a:rPr lang="en-IT" dirty="0"/>
+              <a:t>it models an house where is installed the smart-neighborhood system, it’s described by the </a:t>
+            </a:r>
+            <a:r>
+              <a:rPr lang="en-IT" i="1" dirty="0"/>
+              <a:t>address </a:t>
+            </a:r>
+            <a:r>
+              <a:rPr lang="en-IT" dirty="0"/>
+              <a:t>and the </a:t>
+            </a:r>
+            <a:r>
+              <a:rPr lang="en-IT" i="1" dirty="0"/>
+              <a:t>street number </a:t>
+            </a:r>
+            <a:r>
+              <a:rPr lang="en-IT" dirty="0"/>
+              <a:t>and has a User object associated which represent the owner of the house;</a:t>
+            </a:r>
+          </a:p>
+          <a:p>
+            <a:pPr marL="285750" indent="-285750">
+              <a:buFont typeface="Arial" panose="020B0604020202020204" pitchFamily="34" charset="0"/>
+              <a:buChar char="•"/>
+            </a:pPr>
+            <a:r>
+              <a:rPr lang="en-IT" b="1" dirty="0"/>
+              <a:t>Window: </a:t>
+            </a:r>
+            <a:r>
+              <a:rPr lang="en-IT" dirty="0"/>
+              <a:t>it is a generic window object, each one assiocated to a house and has a current </a:t>
+            </a:r>
+            <a:r>
+              <a:rPr lang="en-IT" i="1" dirty="0"/>
+              <a:t>state </a:t>
+            </a:r>
+            <a:r>
+              <a:rPr lang="en-IT" dirty="0"/>
+              <a:t>(closed or open), a text </a:t>
+            </a:r>
+            <a:r>
+              <a:rPr lang="en-IT" i="1" dirty="0"/>
+              <a:t>description, </a:t>
+            </a:r>
+            <a:r>
+              <a:rPr lang="en-IT" dirty="0"/>
+              <a:t>a </a:t>
+            </a:r>
+            <a:r>
+              <a:rPr lang="en-IT" i="1" dirty="0"/>
+              <a:t>device name </a:t>
+            </a:r>
+            <a:r>
+              <a:rPr lang="en-IT" dirty="0"/>
+              <a:t>(identifier of arduino that manages this specific window) and a </a:t>
+            </a:r>
+            <a:r>
+              <a:rPr lang="en-IT" i="1" dirty="0"/>
+              <a:t>pin</a:t>
+            </a:r>
+            <a:r>
+              <a:rPr lang="en-IT" dirty="0"/>
+              <a:t> (pin connected to the actuator in the arduino board), a </a:t>
+            </a:r>
+            <a:r>
+              <a:rPr lang="en-IT" i="1" dirty="0"/>
+              <a:t>timeout, </a:t>
+            </a:r>
+            <a:r>
+              <a:rPr lang="en-IT" dirty="0"/>
+              <a:t>a boolean field which says if the window can be moved autonomously by the system or not, and finally a date which represents the </a:t>
+            </a:r>
+            <a:r>
+              <a:rPr lang="en-IT" i="1" dirty="0"/>
+              <a:t>last_change </a:t>
+            </a:r>
+            <a:r>
+              <a:rPr lang="en-IT" dirty="0"/>
+              <a:t>timestamp.</a:t>
+            </a:r>
+            <a:endParaRPr lang="en-IT" b="1" dirty="0"/>
           </a:p>
         </p:txBody>
       </p:sp>
     </p:spTree>
     <p:extLst>
       <p:ext uri="{BB962C8B-B14F-4D97-AF65-F5344CB8AC3E}">
-        <p14:creationId xmlns:p14="http://schemas.microsoft.com/office/powerpoint/2010/main" val="2871504610"/>
+        <p14:creationId xmlns:p14="http://schemas.microsoft.com/office/powerpoint/2010/main" val="4176419909"/>
       </p:ext>
     </p:extLst>
   </p:cSld>
@@ -7390,7 +7545,7 @@
           <p:cNvPr id="2" name="Titolo 1">
             <a:extLst>
               <a:ext uri="{FF2B5EF4-FFF2-40B4-BE49-F238E27FC236}">
-                <a16:creationId xmlns:a16="http://schemas.microsoft.com/office/drawing/2014/main" id="{CA44F50E-E660-4EE1-A36B-B75DBCBF422E}"/>
+                <a16:creationId xmlns:a16="http://schemas.microsoft.com/office/drawing/2014/main" id="{00C2A123-0917-441F-A181-BA0AD5570E29}"/>
               </a:ext>
             </a:extLst>
           </p:cNvPr>
@@ -7407,24 +7562,16 @@
           <a:lstStyle/>
           <a:p>
             <a:r>
+              <a:rPr lang="it-IT" dirty="0" err="1"/>
+              <a:t>OpenWeather</a:t>
+            </a:r>
+            <a:r>
               <a:rPr lang="it-IT" dirty="0"/>
-              <a:t>Extra: </a:t>
+              <a:t> </a:t>
             </a:r>
             <a:r>
               <a:rPr lang="it-IT" dirty="0" err="1"/>
-              <a:t>Reinforcement</a:t>
-            </a:r>
-            <a:r>
-              <a:rPr lang="it-IT" dirty="0"/>
-              <a:t> Learning </a:t>
-            </a:r>
-            <a:r>
-              <a:rPr lang="it-IT" dirty="0" err="1"/>
-              <a:t>predictions</a:t>
-            </a:r>
-            <a:r>
-              <a:rPr lang="it-IT" dirty="0"/>
-              <a:t> with DQN</a:t>
+              <a:t>codes</a:t>
             </a:r>
             <a:endParaRPr lang="en-GB" dirty="0"/>
           </a:p>
@@ -7435,7 +7582,7 @@
           <p:cNvPr id="3" name="Segnaposto contenuto 2">
             <a:extLst>
               <a:ext uri="{FF2B5EF4-FFF2-40B4-BE49-F238E27FC236}">
-                <a16:creationId xmlns:a16="http://schemas.microsoft.com/office/drawing/2014/main" id="{DBF8575B-E0C7-42AF-97D6-1FC140DE9295}"/>
+                <a16:creationId xmlns:a16="http://schemas.microsoft.com/office/drawing/2014/main" id="{DFDF4A4E-5ADE-494E-ABB5-7DC693692AD8}"/>
               </a:ext>
             </a:extLst>
           </p:cNvPr>
@@ -7446,56 +7593,199 @@
             <p:ph idx="1"/>
           </p:nvPr>
         </p:nvSpPr>
-        <p:spPr/>
+        <p:spPr>
+          <a:xfrm>
+            <a:off x="1097280" y="1845734"/>
+            <a:ext cx="10058400" cy="4023360"/>
+          </a:xfrm>
+        </p:spPr>
         <p:txBody>
           <a:bodyPr>
-            <a:normAutofit/>
+            <a:normAutofit lnSpcReduction="10000"/>
           </a:bodyPr>
           <a:lstStyle/>
+          <a:p>
+            <a:pPr marL="0" indent="0">
+              <a:buNone/>
+            </a:pPr>
+            <a:r>
+              <a:rPr lang="en-GB" dirty="0"/>
+              <a:t>The data retrieved from the </a:t>
+            </a:r>
+            <a:r>
+              <a:rPr lang="en-GB" dirty="0" err="1"/>
+              <a:t>OpenWeather</a:t>
+            </a:r>
+            <a:r>
+              <a:rPr lang="en-GB" dirty="0"/>
+              <a:t> APIs are the temperature and the weather condition, the latter is categorized in different codes, we assigned each of them to a close/open/ambiguous condition in order to process the information and take the correct decision:</a:t>
+            </a:r>
+          </a:p>
           <a:p>
             <a:pPr>
               <a:buFont typeface="Arial" panose="020B0604020202020204" pitchFamily="34" charset="0"/>
               <a:buChar char="•"/>
             </a:pPr>
             <a:r>
-              <a:rPr lang="it-IT" dirty="0"/>
-              <a:t> DQN (Deep Q-Learning Networks) </a:t>
-            </a:r>
-            <a:r>
-              <a:rPr lang="it-IT" dirty="0" err="1"/>
-              <a:t>is</a:t>
-            </a:r>
-            <a:r>
-              <a:rPr lang="it-IT" dirty="0"/>
-              <a:t> a model-free </a:t>
-            </a:r>
-            <a:r>
-              <a:rPr lang="it-IT" dirty="0" err="1"/>
-              <a:t>reinforcement</a:t>
-            </a:r>
-            <a:r>
-              <a:rPr lang="it-IT" dirty="0"/>
-              <a:t> learning </a:t>
-            </a:r>
-            <a:r>
-              <a:rPr lang="it-IT" dirty="0" err="1"/>
-              <a:t>algorithm</a:t>
-            </a:r>
-            <a:r>
-              <a:rPr lang="it-IT" dirty="0"/>
-              <a:t>. </a:t>
-            </a:r>
-            <a:r>
               <a:rPr lang="en-GB" dirty="0"/>
-              <a:t>Model free RL algorithms don’t learn a model of their environment’s transition function to make predictions of future states and rewards.</a:t>
-            </a:r>
+              <a:t>Group 2xx: </a:t>
+            </a:r>
+            <a:r>
+              <a:rPr lang="en-GB" b="1" dirty="0"/>
+              <a:t>thunderstorm, </a:t>
+            </a:r>
+            <a:r>
+              <a:rPr lang="en-GB" dirty="0"/>
+              <a:t>we consider it as a </a:t>
+            </a:r>
+            <a:r>
+              <a:rPr lang="en-GB" i="1" dirty="0"/>
+              <a:t>close condition;</a:t>
+            </a:r>
+          </a:p>
+          <a:p>
+            <a:pPr>
+              <a:buFont typeface="Arial" panose="020B0604020202020204" pitchFamily="34" charset="0"/>
+              <a:buChar char="•"/>
+            </a:pPr>
+            <a:r>
+              <a:rPr lang="en-GB" dirty="0"/>
+              <a:t>Group 3xx: </a:t>
+            </a:r>
+            <a:r>
+              <a:rPr lang="en-GB" b="1" dirty="0"/>
+              <a:t>drizzle,</a:t>
+            </a:r>
+            <a:r>
+              <a:rPr lang="en-GB" dirty="0"/>
+              <a:t> we consider it as an </a:t>
+            </a:r>
+            <a:r>
+              <a:rPr lang="en-GB" i="1" dirty="0"/>
+              <a:t>ambiguous condition;</a:t>
+            </a:r>
+          </a:p>
+          <a:p>
+            <a:pPr>
+              <a:buFont typeface="Arial" panose="020B0604020202020204" pitchFamily="34" charset="0"/>
+              <a:buChar char="•"/>
+            </a:pPr>
+            <a:r>
+              <a:rPr lang="en-GB" dirty="0"/>
+              <a:t>Group 5xx: </a:t>
+            </a:r>
+            <a:r>
+              <a:rPr lang="en-GB" b="1" dirty="0"/>
+              <a:t>rain,</a:t>
+            </a:r>
+            <a:r>
+              <a:rPr lang="en-GB" dirty="0"/>
+              <a:t> we consider it as a </a:t>
+            </a:r>
+            <a:r>
+              <a:rPr lang="en-GB" i="1" dirty="0"/>
+              <a:t>close condition</a:t>
+            </a:r>
+            <a:r>
+              <a:rPr lang="en-GB" dirty="0"/>
+              <a:t>;</a:t>
+            </a:r>
+          </a:p>
+          <a:p>
+            <a:pPr>
+              <a:buFont typeface="Arial" panose="020B0604020202020204" pitchFamily="34" charset="0"/>
+              <a:buChar char="•"/>
+            </a:pPr>
+            <a:r>
+              <a:rPr lang="en-GB" dirty="0"/>
+              <a:t>Group 6xx: </a:t>
+            </a:r>
+            <a:r>
+              <a:rPr lang="en-GB" b="1" dirty="0"/>
+              <a:t>snow,</a:t>
+            </a:r>
+            <a:r>
+              <a:rPr lang="en-GB" dirty="0"/>
+              <a:t> we consider it as a </a:t>
+            </a:r>
+            <a:r>
+              <a:rPr lang="en-GB" i="1" dirty="0"/>
+              <a:t>close condition;</a:t>
+            </a:r>
+          </a:p>
+          <a:p>
+            <a:pPr>
+              <a:buFont typeface="Arial" panose="020B0604020202020204" pitchFamily="34" charset="0"/>
+              <a:buChar char="•"/>
+            </a:pPr>
+            <a:r>
+              <a:rPr lang="en-GB" dirty="0"/>
+              <a:t>Group 7xx: </a:t>
+            </a:r>
+            <a:r>
+              <a:rPr lang="en-GB" b="1" dirty="0"/>
+              <a:t>atmosphere,</a:t>
+            </a:r>
+            <a:r>
+              <a:rPr lang="en-GB" dirty="0"/>
+              <a:t> we consider it as an </a:t>
+            </a:r>
+            <a:r>
+              <a:rPr lang="en-GB" i="1" dirty="0"/>
+              <a:t>open condition;</a:t>
+            </a:r>
+          </a:p>
+          <a:p>
+            <a:pPr>
+              <a:buFont typeface="Arial" panose="020B0604020202020204" pitchFamily="34" charset="0"/>
+              <a:buChar char="•"/>
+            </a:pPr>
+            <a:r>
+              <a:rPr lang="en-GB" dirty="0"/>
+              <a:t>Value 800: </a:t>
+            </a:r>
+            <a:r>
+              <a:rPr lang="en-GB" b="1" dirty="0"/>
+              <a:t>clear,</a:t>
+            </a:r>
+            <a:r>
+              <a:rPr lang="en-GB" dirty="0"/>
+              <a:t> we consider it as an </a:t>
+            </a:r>
+            <a:r>
+              <a:rPr lang="en-GB" i="1" dirty="0"/>
+              <a:t>open condition;</a:t>
+            </a:r>
+          </a:p>
+          <a:p>
+            <a:pPr>
+              <a:buFont typeface="Arial" panose="020B0604020202020204" pitchFamily="34" charset="0"/>
+              <a:buChar char="•"/>
+            </a:pPr>
+            <a:r>
+              <a:rPr lang="en-GB" dirty="0"/>
+              <a:t>Group 80x: </a:t>
+            </a:r>
+            <a:r>
+              <a:rPr lang="en-GB" b="1" dirty="0"/>
+              <a:t>clouds,</a:t>
+            </a:r>
+            <a:r>
+              <a:rPr lang="en-GB" dirty="0"/>
+              <a:t> we consider it as an </a:t>
+            </a:r>
+            <a:r>
+              <a:rPr lang="en-GB" i="1" dirty="0"/>
+              <a:t>ambiguous condition.</a:t>
+            </a:r>
+            <a:endParaRPr lang="en-GB" dirty="0"/>
           </a:p>
         </p:txBody>
       </p:sp>
     </p:spTree>
     <p:extLst>
       <p:ext uri="{BB962C8B-B14F-4D97-AF65-F5344CB8AC3E}">
-        <p14:creationId xmlns:p14="http://schemas.microsoft.com/office/powerpoint/2010/main" val="2089512660"/>
+        <p14:creationId xmlns:p14="http://schemas.microsoft.com/office/powerpoint/2010/main" val="2871504610"/>
       </p:ext>
     </p:extLst>
   </p:cSld>
@@ -7684,7 +7974,7 @@
           <p:cNvPr id="2" name="Titolo 1">
             <a:extLst>
               <a:ext uri="{FF2B5EF4-FFF2-40B4-BE49-F238E27FC236}">
-                <a16:creationId xmlns:a16="http://schemas.microsoft.com/office/drawing/2014/main" id="{D5C96224-4790-4F75-8C9F-E7D3546A668A}"/>
+                <a16:creationId xmlns:a16="http://schemas.microsoft.com/office/drawing/2014/main" id="{CA44F50E-E660-4EE1-A36B-B75DBCBF422E}"/>
               </a:ext>
             </a:extLst>
           </p:cNvPr>
@@ -7701,12 +7991,24 @@
           <a:lstStyle/>
           <a:p>
             <a:r>
+              <a:rPr lang="it-IT" dirty="0"/>
+              <a:t>Extra: </a:t>
+            </a:r>
+            <a:r>
               <a:rPr lang="it-IT" dirty="0" err="1"/>
-              <a:t>Vanilla</a:t>
+              <a:t>Reinforcement</a:t>
             </a:r>
             <a:r>
               <a:rPr lang="it-IT" dirty="0"/>
-              <a:t> Q-Learning</a:t>
+              <a:t> Learning </a:t>
+            </a:r>
+            <a:r>
+              <a:rPr lang="it-IT" dirty="0" err="1"/>
+              <a:t>predictions</a:t>
+            </a:r>
+            <a:r>
+              <a:rPr lang="it-IT" dirty="0"/>
+              <a:t> with DQN</a:t>
             </a:r>
             <a:endParaRPr lang="en-GB" dirty="0"/>
           </a:p>
@@ -7717,7 +8019,7 @@
           <p:cNvPr id="3" name="Segnaposto contenuto 2">
             <a:extLst>
               <a:ext uri="{FF2B5EF4-FFF2-40B4-BE49-F238E27FC236}">
-                <a16:creationId xmlns:a16="http://schemas.microsoft.com/office/drawing/2014/main" id="{E3DB408E-AD0C-4641-9231-2EAD55A4A921}"/>
+                <a16:creationId xmlns:a16="http://schemas.microsoft.com/office/drawing/2014/main" id="{DBF8575B-E0C7-42AF-97D6-1FC140DE9295}"/>
               </a:ext>
             </a:extLst>
           </p:cNvPr>
@@ -7730,7 +8032,9 @@
         </p:nvSpPr>
         <p:spPr/>
         <p:txBody>
-          <a:bodyPr/>
+          <a:bodyPr>
+            <a:normAutofit/>
+          </a:bodyPr>
           <a:lstStyle/>
           <a:p>
             <a:pPr>
@@ -7738,88 +8042,44 @@
               <a:buChar char="•"/>
             </a:pPr>
             <a:r>
+              <a:rPr lang="it-IT" dirty="0"/>
+              <a:t> DQN (Deep Q-Learning Networks) </a:t>
+            </a:r>
+            <a:r>
+              <a:rPr lang="it-IT" dirty="0" err="1"/>
+              <a:t>is</a:t>
+            </a:r>
+            <a:r>
+              <a:rPr lang="it-IT" dirty="0"/>
+              <a:t> a model-free </a:t>
+            </a:r>
+            <a:r>
+              <a:rPr lang="it-IT" dirty="0" err="1"/>
+              <a:t>reinforcement</a:t>
+            </a:r>
+            <a:r>
+              <a:rPr lang="it-IT" dirty="0"/>
+              <a:t> learning </a:t>
+            </a:r>
+            <a:r>
+              <a:rPr lang="it-IT" dirty="0" err="1"/>
+              <a:t>algorithm</a:t>
+            </a:r>
+            <a:r>
+              <a:rPr lang="it-IT" dirty="0"/>
+              <a:t>. </a:t>
+            </a:r>
+            <a:r>
               <a:rPr lang="en-GB" dirty="0"/>
-              <a:t>The vanilla Q-Learning uses a </a:t>
-            </a:r>
-            <a:r>
-              <a:rPr lang="en-GB" b="1" dirty="0"/>
-              <a:t>Q-table, </a:t>
-            </a:r>
-            <a:r>
-              <a:rPr lang="en-GB" dirty="0"/>
-              <a:t>a simple data structure that we use to keep track of the states, actions, and their expected rewards. More specifically, the Q-table maps a state-action pair to a </a:t>
-            </a:r>
-            <a:r>
-              <a:rPr lang="en-GB" b="1" dirty="0"/>
-              <a:t>Q-value</a:t>
-            </a:r>
-            <a:r>
-              <a:rPr lang="en-GB" dirty="0"/>
-              <a:t> (the estimated optimal future value) which the agent will learn. At the start of the Q-Learning algorithm, the Q-table is initialized to all zeros indicating that the agent doesn’t know anything about the world. As the agent tries out different actions at different states through trial and error, the agent learns each state-action pair’s expected reward and updates the Q-table with the new Q-value. Using trial and error to learn about the world is called </a:t>
-            </a:r>
-            <a:r>
-              <a:rPr lang="en-GB" b="1" dirty="0"/>
-              <a:t>Exploration</a:t>
-            </a:r>
-            <a:r>
-              <a:rPr lang="en-GB" dirty="0"/>
-              <a:t>.</a:t>
-            </a:r>
-          </a:p>
-          <a:p>
-            <a:pPr>
-              <a:buFont typeface="Arial" panose="020B0604020202020204" pitchFamily="34" charset="0"/>
-              <a:buChar char="•"/>
-            </a:pPr>
-            <a:r>
-              <a:rPr lang="en-GB" dirty="0"/>
-              <a:t> The </a:t>
-            </a:r>
-            <a:r>
-              <a:rPr lang="en-GB" b="1" dirty="0"/>
-              <a:t>Q-Value</a:t>
-            </a:r>
-            <a:r>
-              <a:rPr lang="en-GB" dirty="0"/>
-              <a:t> is the maximum expected reward an agent can reach by taking a given action A from the state S. After an agent has learned the Q-value of each state-action pair, the agent at state </a:t>
-            </a:r>
-            <a:r>
-              <a:rPr lang="en-GB" b="1" dirty="0"/>
-              <a:t>S</a:t>
-            </a:r>
-            <a:r>
-              <a:rPr lang="en-GB" dirty="0"/>
-              <a:t> maximizes its expected reward by choosing the action </a:t>
-            </a:r>
-            <a:r>
-              <a:rPr lang="en-GB" b="1" dirty="0"/>
-              <a:t>A</a:t>
-            </a:r>
-            <a:r>
-              <a:rPr lang="en-GB" dirty="0"/>
-              <a:t> with the highest expected reward. Explicitly choosing the best known action at a state is called </a:t>
-            </a:r>
-            <a:r>
-              <a:rPr lang="en-GB" b="1" dirty="0"/>
-              <a:t>Exploitation</a:t>
-            </a:r>
-            <a:r>
-              <a:rPr lang="en-GB" dirty="0"/>
-              <a:t>.</a:t>
-            </a:r>
-          </a:p>
-          <a:p>
-            <a:pPr marL="0" indent="0">
-              <a:buNone/>
-            </a:pPr>
-            <a:endParaRPr lang="en-GB" dirty="0"/>
+              <a:t>Model free RL algorithms don’t learn a model of their environment’s transition function to make predictions of future states and rewards.</a:t>
+            </a:r>
           </a:p>
         </p:txBody>
       </p:sp>
     </p:spTree>
     <p:extLst>
       <p:ext uri="{BB962C8B-B14F-4D97-AF65-F5344CB8AC3E}">
-        <p14:creationId xmlns:p14="http://schemas.microsoft.com/office/powerpoint/2010/main" val="496101187"/>
+        <p14:creationId xmlns:p14="http://schemas.microsoft.com/office/powerpoint/2010/main" val="2089512660"/>
       </p:ext>
     </p:extLst>
   </p:cSld>
@@ -7851,6 +8111,173 @@
           <p:cNvPr id="2" name="Titolo 1">
             <a:extLst>
               <a:ext uri="{FF2B5EF4-FFF2-40B4-BE49-F238E27FC236}">
+                <a16:creationId xmlns:a16="http://schemas.microsoft.com/office/drawing/2014/main" id="{D5C96224-4790-4F75-8C9F-E7D3546A668A}"/>
+              </a:ext>
+            </a:extLst>
+          </p:cNvPr>
+          <p:cNvSpPr>
+            <a:spLocks noGrp="1"/>
+          </p:cNvSpPr>
+          <p:nvPr>
+            <p:ph type="title"/>
+          </p:nvPr>
+        </p:nvSpPr>
+        <p:spPr/>
+        <p:txBody>
+          <a:bodyPr/>
+          <a:lstStyle/>
+          <a:p>
+            <a:r>
+              <a:rPr lang="it-IT" dirty="0" err="1"/>
+              <a:t>Vanilla</a:t>
+            </a:r>
+            <a:r>
+              <a:rPr lang="it-IT" dirty="0"/>
+              <a:t> Q-Learning</a:t>
+            </a:r>
+            <a:endParaRPr lang="en-GB" dirty="0"/>
+          </a:p>
+        </p:txBody>
+      </p:sp>
+      <p:sp>
+        <p:nvSpPr>
+          <p:cNvPr id="3" name="Segnaposto contenuto 2">
+            <a:extLst>
+              <a:ext uri="{FF2B5EF4-FFF2-40B4-BE49-F238E27FC236}">
+                <a16:creationId xmlns:a16="http://schemas.microsoft.com/office/drawing/2014/main" id="{E3DB408E-AD0C-4641-9231-2EAD55A4A921}"/>
+              </a:ext>
+            </a:extLst>
+          </p:cNvPr>
+          <p:cNvSpPr>
+            <a:spLocks noGrp="1"/>
+          </p:cNvSpPr>
+          <p:nvPr>
+            <p:ph idx="1"/>
+          </p:nvPr>
+        </p:nvSpPr>
+        <p:spPr/>
+        <p:txBody>
+          <a:bodyPr/>
+          <a:lstStyle/>
+          <a:p>
+            <a:pPr>
+              <a:buFont typeface="Arial" panose="020B0604020202020204" pitchFamily="34" charset="0"/>
+              <a:buChar char="•"/>
+            </a:pPr>
+            <a:r>
+              <a:rPr lang="en-GB" dirty="0"/>
+              <a:t>The vanilla Q-Learning uses a </a:t>
+            </a:r>
+            <a:r>
+              <a:rPr lang="en-GB" b="1" dirty="0"/>
+              <a:t>Q-table, </a:t>
+            </a:r>
+            <a:r>
+              <a:rPr lang="en-GB" dirty="0"/>
+              <a:t>a simple data structure that we use to keep track of the states, actions, and their expected rewards. More specifically, the Q-table maps a state-action pair to a </a:t>
+            </a:r>
+            <a:r>
+              <a:rPr lang="en-GB" b="1" dirty="0"/>
+              <a:t>Q-value</a:t>
+            </a:r>
+            <a:r>
+              <a:rPr lang="en-GB" dirty="0"/>
+              <a:t> (the estimated optimal future value) which the agent will learn. At the start of the Q-Learning algorithm, the Q-table is initialized to all zeros indicating that the agent doesn’t know anything about the world. As the agent tries out different actions at different states through trial and error, the agent learns each state-action pair’s expected reward and updates the Q-table with the new Q-value. Using trial and error to learn about the world is called </a:t>
+            </a:r>
+            <a:r>
+              <a:rPr lang="en-GB" b="1" dirty="0"/>
+              <a:t>Exploration</a:t>
+            </a:r>
+            <a:r>
+              <a:rPr lang="en-GB" dirty="0"/>
+              <a:t>.</a:t>
+            </a:r>
+          </a:p>
+          <a:p>
+            <a:pPr>
+              <a:buFont typeface="Arial" panose="020B0604020202020204" pitchFamily="34" charset="0"/>
+              <a:buChar char="•"/>
+            </a:pPr>
+            <a:r>
+              <a:rPr lang="en-GB" dirty="0"/>
+              <a:t> The </a:t>
+            </a:r>
+            <a:r>
+              <a:rPr lang="en-GB" b="1" dirty="0"/>
+              <a:t>Q-Value</a:t>
+            </a:r>
+            <a:r>
+              <a:rPr lang="en-GB" dirty="0"/>
+              <a:t> is the maximum expected reward an agent can reach by taking a given action A from the state S. After an agent has learned the Q-value of each state-action pair, the agent at state </a:t>
+            </a:r>
+            <a:r>
+              <a:rPr lang="en-GB" b="1" dirty="0"/>
+              <a:t>S</a:t>
+            </a:r>
+            <a:r>
+              <a:rPr lang="en-GB" dirty="0"/>
+              <a:t> maximizes its expected reward by choosing the action </a:t>
+            </a:r>
+            <a:r>
+              <a:rPr lang="en-GB" b="1" dirty="0"/>
+              <a:t>A</a:t>
+            </a:r>
+            <a:r>
+              <a:rPr lang="en-GB" dirty="0"/>
+              <a:t> with the highest expected reward. Explicitly choosing the best known action at a state is called </a:t>
+            </a:r>
+            <a:r>
+              <a:rPr lang="en-GB" b="1" dirty="0"/>
+              <a:t>Exploitation</a:t>
+            </a:r>
+            <a:r>
+              <a:rPr lang="en-GB" dirty="0"/>
+              <a:t>.</a:t>
+            </a:r>
+          </a:p>
+          <a:p>
+            <a:pPr marL="0" indent="0">
+              <a:buNone/>
+            </a:pPr>
+            <a:endParaRPr lang="en-GB" dirty="0"/>
+          </a:p>
+        </p:txBody>
+      </p:sp>
+    </p:spTree>
+    <p:extLst>
+      <p:ext uri="{BB962C8B-B14F-4D97-AF65-F5344CB8AC3E}">
+        <p14:creationId xmlns:p14="http://schemas.microsoft.com/office/powerpoint/2010/main" val="496101187"/>
+      </p:ext>
+    </p:extLst>
+  </p:cSld>
+  <p:clrMapOvr>
+    <a:masterClrMapping/>
+  </p:clrMapOvr>
+</p:sld>
+</file>
+
+<file path=ppt/slides/slide22.xml><?xml version="1.0" encoding="utf-8"?>
+<p:sld xmlns:a="http://schemas.openxmlformats.org/drawingml/2006/main" xmlns:r="http://schemas.openxmlformats.org/officeDocument/2006/relationships" xmlns:p="http://schemas.openxmlformats.org/presentationml/2006/main">
+  <p:cSld>
+    <p:spTree>
+      <p:nvGrpSpPr>
+        <p:cNvPr id="1" name=""/>
+        <p:cNvGrpSpPr/>
+        <p:nvPr/>
+      </p:nvGrpSpPr>
+      <p:grpSpPr>
+        <a:xfrm>
+          <a:off x="0" y="0"/>
+          <a:ext cx="0" cy="0"/>
+          <a:chOff x="0" y="0"/>
+          <a:chExt cx="0" cy="0"/>
+        </a:xfrm>
+      </p:grpSpPr>
+      <p:sp>
+        <p:nvSpPr>
+          <p:cNvPr id="2" name="Titolo 1">
+            <a:extLst>
+              <a:ext uri="{FF2B5EF4-FFF2-40B4-BE49-F238E27FC236}">
                 <a16:creationId xmlns:a16="http://schemas.microsoft.com/office/drawing/2014/main" id="{D5F2B4DE-3E0B-42A6-9ED3-A37C3E2BAE50}"/>
               </a:ext>
             </a:extLst>
@@ -7979,7 +8406,7 @@
 </p:sld>
 </file>
 
-<file path=ppt/slides/slide22.xml><?xml version="1.0" encoding="utf-8"?>
+<file path=ppt/slides/slide23.xml><?xml version="1.0" encoding="utf-8"?>
 <p:sld xmlns:a="http://schemas.openxmlformats.org/drawingml/2006/main" xmlns:r="http://schemas.openxmlformats.org/officeDocument/2006/relationships" xmlns:p="http://schemas.openxmlformats.org/presentationml/2006/main">
   <p:cSld>
     <p:spTree>
@@ -8182,7 +8609,7 @@
 </p:sld>
 </file>
 
-<file path=ppt/slides/slide23.xml><?xml version="1.0" encoding="utf-8"?>
+<file path=ppt/slides/slide24.xml><?xml version="1.0" encoding="utf-8"?>
 <p:sld xmlns:a="http://schemas.openxmlformats.org/drawingml/2006/main" xmlns:r="http://schemas.openxmlformats.org/officeDocument/2006/relationships" xmlns:p="http://schemas.openxmlformats.org/presentationml/2006/main">
   <p:cSld>
     <p:spTree>
@@ -8635,7 +9062,7 @@
 </p:sld>
 </file>
 
-<file path=ppt/slides/slide24.xml><?xml version="1.0" encoding="utf-8"?>
+<file path=ppt/slides/slide25.xml><?xml version="1.0" encoding="utf-8"?>
 <p:sld xmlns:a="http://schemas.openxmlformats.org/drawingml/2006/main" xmlns:r="http://schemas.openxmlformats.org/officeDocument/2006/relationships" xmlns:p="http://schemas.openxmlformats.org/presentationml/2006/main">
   <p:cSld>
     <p:spTree>
@@ -8780,7 +9207,7 @@
 </p:sld>
 </file>
 
-<file path=ppt/slides/slide25.xml><?xml version="1.0" encoding="utf-8"?>
+<file path=ppt/slides/slide26.xml><?xml version="1.0" encoding="utf-8"?>
 <p:sld xmlns:a="http://schemas.openxmlformats.org/drawingml/2006/main" xmlns:r="http://schemas.openxmlformats.org/officeDocument/2006/relationships" xmlns:p="http://schemas.openxmlformats.org/presentationml/2006/main">
   <p:cSld>
     <p:spTree>
@@ -8876,7 +9303,7 @@
 </p:sld>
 </file>
 
-<file path=ppt/slides/slide26.xml><?xml version="1.0" encoding="utf-8"?>
+<file path=ppt/slides/slide27.xml><?xml version="1.0" encoding="utf-8"?>
 <p:sld xmlns:a="http://schemas.openxmlformats.org/drawingml/2006/main" xmlns:r="http://schemas.openxmlformats.org/officeDocument/2006/relationships" xmlns:p="http://schemas.openxmlformats.org/presentationml/2006/main">
   <p:cSld>
     <p:spTree>

</xml_diff>

<commit_message>
Added image bot telegram to ppt
</commit_message>
<xml_diff>
--- a/Smart Neighborhood.pptx
+++ b/Smart Neighborhood.pptx
@@ -411,7 +411,7 @@
           <a:p>
             <a:fld id="{053125B1-4250-40AD-8036-A38D44547BC7}" type="slidenum">
               <a:rPr lang="en-GB" smtClean="0"/>
-              <a:t>‹N›</a:t>
+              <a:t>‹#›</a:t>
             </a:fld>
             <a:endParaRPr lang="en-GB"/>
           </a:p>
@@ -619,7 +619,7 @@
           <a:p>
             <a:fld id="{053125B1-4250-40AD-8036-A38D44547BC7}" type="slidenum">
               <a:rPr lang="en-GB" smtClean="0"/>
-              <a:t>‹N›</a:t>
+              <a:t>‹#›</a:t>
             </a:fld>
             <a:endParaRPr lang="en-GB"/>
           </a:p>
@@ -875,7 +875,7 @@
           <a:p>
             <a:fld id="{053125B1-4250-40AD-8036-A38D44547BC7}" type="slidenum">
               <a:rPr lang="en-GB" smtClean="0"/>
-              <a:t>‹N›</a:t>
+              <a:t>‹#›</a:t>
             </a:fld>
             <a:endParaRPr lang="en-GB"/>
           </a:p>
@@ -1049,7 +1049,7 @@
           <a:p>
             <a:fld id="{053125B1-4250-40AD-8036-A38D44547BC7}" type="slidenum">
               <a:rPr lang="en-GB" smtClean="0"/>
-              <a:t>‹N›</a:t>
+              <a:t>‹#›</a:t>
             </a:fld>
             <a:endParaRPr lang="en-GB"/>
           </a:p>
@@ -1392,7 +1392,7 @@
           <a:p>
             <a:fld id="{053125B1-4250-40AD-8036-A38D44547BC7}" type="slidenum">
               <a:rPr lang="en-GB" smtClean="0"/>
-              <a:t>‹N›</a:t>
+              <a:t>‹#›</a:t>
             </a:fld>
             <a:endParaRPr lang="en-GB"/>
           </a:p>
@@ -1667,7 +1667,7 @@
           <a:p>
             <a:fld id="{053125B1-4250-40AD-8036-A38D44547BC7}" type="slidenum">
               <a:rPr lang="en-GB" smtClean="0"/>
-              <a:t>‹N›</a:t>
+              <a:t>‹#›</a:t>
             </a:fld>
             <a:endParaRPr lang="en-GB"/>
           </a:p>
@@ -2046,7 +2046,7 @@
           <a:p>
             <a:fld id="{053125B1-4250-40AD-8036-A38D44547BC7}" type="slidenum">
               <a:rPr lang="en-GB" smtClean="0"/>
-              <a:t>‹N›</a:t>
+              <a:t>‹#›</a:t>
             </a:fld>
             <a:endParaRPr lang="en-GB"/>
           </a:p>
@@ -2164,7 +2164,7 @@
           <a:p>
             <a:fld id="{053125B1-4250-40AD-8036-A38D44547BC7}" type="slidenum">
               <a:rPr lang="en-GB" smtClean="0"/>
-              <a:t>‹N›</a:t>
+              <a:t>‹#›</a:t>
             </a:fld>
             <a:endParaRPr lang="en-GB"/>
           </a:p>
@@ -2343,7 +2343,7 @@
           <a:p>
             <a:fld id="{053125B1-4250-40AD-8036-A38D44547BC7}" type="slidenum">
               <a:rPr lang="en-GB" smtClean="0"/>
-              <a:t>‹N›</a:t>
+              <a:t>‹#›</a:t>
             </a:fld>
             <a:endParaRPr lang="en-GB"/>
           </a:p>
@@ -2710,7 +2710,7 @@
           <a:p>
             <a:fld id="{053125B1-4250-40AD-8036-A38D44547BC7}" type="slidenum">
               <a:rPr lang="en-GB" smtClean="0"/>
-              <a:t>‹N›</a:t>
+              <a:t>‹#›</a:t>
             </a:fld>
             <a:endParaRPr lang="en-GB"/>
           </a:p>
@@ -3071,7 +3071,7 @@
           <a:p>
             <a:fld id="{053125B1-4250-40AD-8036-A38D44547BC7}" type="slidenum">
               <a:rPr lang="en-GB" smtClean="0"/>
-              <a:t>‹N›</a:t>
+              <a:t>‹#›</a:t>
             </a:fld>
             <a:endParaRPr lang="en-GB"/>
           </a:p>
@@ -3390,7 +3390,7 @@
           <a:p>
             <a:fld id="{053125B1-4250-40AD-8036-A38D44547BC7}" type="slidenum">
               <a:rPr lang="en-GB" smtClean="0"/>
-              <a:t>‹N›</a:t>
+              <a:t>‹#›</a:t>
             </a:fld>
             <a:endParaRPr lang="en-GB"/>
           </a:p>
@@ -8211,27 +8211,29 @@
         </p:nvSpPr>
         <p:spPr/>
         <p:txBody>
-          <a:bodyPr/>
+          <a:bodyPr>
+            <a:normAutofit/>
+          </a:bodyPr>
           <a:lstStyle/>
           <a:p>
             <a:r>
-              <a:rPr lang="en-GB" dirty="0"/>
+              <a:rPr lang="en-GB" sz="1500" dirty="0"/>
               <a:t>A Telegram bot called </a:t>
             </a:r>
             <a:r>
-              <a:rPr lang="en-GB" i="1" dirty="0" err="1"/>
+              <a:rPr lang="en-GB" sz="1500" i="1" dirty="0" err="1"/>
               <a:t>smart_neighborhood</a:t>
             </a:r>
             <a:r>
-              <a:rPr lang="en-GB" dirty="0"/>
+              <a:rPr lang="en-GB" sz="1500" dirty="0"/>
               <a:t> is used to </a:t>
             </a:r>
             <a:r>
-              <a:rPr lang="en-GB" b="1" dirty="0"/>
+              <a:rPr lang="en-GB" sz="1500" b="1" dirty="0"/>
               <a:t>notify the house’s owners whenever the system decides to move the windows</a:t>
             </a:r>
             <a:r>
-              <a:rPr lang="en-GB" dirty="0"/>
+              <a:rPr lang="en-GB" sz="1500" dirty="0"/>
               <a:t>. The bot has two simple commands:</a:t>
             </a:r>
           </a:p>
@@ -8241,15 +8243,15 @@
               <a:buChar char="•"/>
             </a:pPr>
             <a:r>
-              <a:rPr lang="en-GB" dirty="0"/>
+              <a:rPr lang="en-GB" sz="1500" dirty="0"/>
               <a:t> </a:t>
             </a:r>
             <a:r>
-              <a:rPr lang="en-GB" i="1" dirty="0"/>
+              <a:rPr lang="en-GB" sz="1500" i="1" dirty="0"/>
               <a:t>/start, </a:t>
             </a:r>
             <a:r>
-              <a:rPr lang="en-GB" dirty="0"/>
+              <a:rPr lang="en-GB" sz="1500" dirty="0"/>
               <a:t>that is automatically called when the bot is started, gives a welcome message and store, if new, the user in the database;</a:t>
             </a:r>
           </a:p>
@@ -8259,26 +8261,62 @@
               <a:buChar char="•"/>
             </a:pPr>
             <a:r>
-              <a:rPr lang="en-GB" dirty="0"/>
+              <a:rPr lang="en-GB" sz="1500" dirty="0"/>
               <a:t> </a:t>
             </a:r>
             <a:r>
-              <a:rPr lang="en-GB" i="1" dirty="0"/>
+              <a:rPr lang="en-GB" sz="1500" i="1" dirty="0"/>
               <a:t>/help, </a:t>
             </a:r>
             <a:r>
-              <a:rPr lang="en-GB" dirty="0"/>
+              <a:rPr lang="en-GB" sz="1500" dirty="0"/>
               <a:t>which gives a short description of bot’s functionalities.</a:t>
             </a:r>
           </a:p>
           <a:p>
             <a:r>
-              <a:rPr lang="en-GB" dirty="0"/>
+              <a:rPr lang="en-GB" sz="1500" dirty="0"/>
               <a:t>When the engine decides to move the windows, it calls a specific function of the bot which sends a message to all the chat IDs stored in the database in order to make the owners aware of the new state of their windows. In the message, it is also suggested to use the web app to change the state of the windows if the new state does not match the user’s will.</a:t>
             </a:r>
           </a:p>
         </p:txBody>
       </p:sp>
+      <p:pic>
+        <p:nvPicPr>
+          <p:cNvPr id="5" name="Picture 4" descr="Graphical user interface, text, application&#10;&#10;Description automatically generated">
+            <a:extLst>
+              <a:ext uri="{FF2B5EF4-FFF2-40B4-BE49-F238E27FC236}">
+                <a16:creationId xmlns:a16="http://schemas.microsoft.com/office/drawing/2014/main" id="{A8A247D4-D55A-2D2E-9DFD-F16E5FA06B78}"/>
+              </a:ext>
+            </a:extLst>
+          </p:cNvPr>
+          <p:cNvPicPr>
+            <a:picLocks noChangeAspect="1"/>
+          </p:cNvPicPr>
+          <p:nvPr/>
+        </p:nvPicPr>
+        <p:blipFill>
+          <a:blip r:embed="rId2">
+            <a:extLst>
+              <a:ext uri="{28A0092B-C50C-407E-A947-70E740481C1C}">
+                <a14:useLocalDpi xmlns:a14="http://schemas.microsoft.com/office/drawing/2010/main" val="0"/>
+              </a:ext>
+            </a:extLst>
+          </a:blip>
+          <a:stretch>
+            <a:fillRect/>
+          </a:stretch>
+        </p:blipFill>
+        <p:spPr>
+          <a:xfrm>
+            <a:off x="1902435" y="3990999"/>
+            <a:ext cx="8448090" cy="2121536"/>
+          </a:xfrm>
+          <a:prstGeom prst="rect">
+            <a:avLst/>
+          </a:prstGeom>
+        </p:spPr>
+      </p:pic>
     </p:spTree>
     <p:extLst>
       <p:ext uri="{BB962C8B-B14F-4D97-AF65-F5344CB8AC3E}">

</xml_diff>

<commit_message>
Update ppt bot telegram image
</commit_message>
<xml_diff>
--- a/Smart Neighborhood.pptx
+++ b/Smart Neighborhood.pptx
@@ -369,7 +369,7 @@
           <a:p>
             <a:fld id="{8BE6B674-AADE-49EF-9780-6CBE5B9EDB57}" type="datetimeFigureOut">
               <a:rPr lang="en-GB" smtClean="0"/>
-              <a:t>21/05/2022</a:t>
+              <a:t>22/05/2022</a:t>
             </a:fld>
             <a:endParaRPr lang="en-GB"/>
           </a:p>
@@ -577,7 +577,7 @@
           <a:p>
             <a:fld id="{8BE6B674-AADE-49EF-9780-6CBE5B9EDB57}" type="datetimeFigureOut">
               <a:rPr lang="en-GB" smtClean="0"/>
-              <a:t>21/05/2022</a:t>
+              <a:t>22/05/2022</a:t>
             </a:fld>
             <a:endParaRPr lang="en-GB"/>
           </a:p>
@@ -833,7 +833,7 @@
           <a:p>
             <a:fld id="{8BE6B674-AADE-49EF-9780-6CBE5B9EDB57}" type="datetimeFigureOut">
               <a:rPr lang="en-GB" smtClean="0"/>
-              <a:t>21/05/2022</a:t>
+              <a:t>22/05/2022</a:t>
             </a:fld>
             <a:endParaRPr lang="en-GB"/>
           </a:p>
@@ -1007,7 +1007,7 @@
           <a:p>
             <a:fld id="{8BE6B674-AADE-49EF-9780-6CBE5B9EDB57}" type="datetimeFigureOut">
               <a:rPr lang="en-GB" smtClean="0"/>
-              <a:t>21/05/2022</a:t>
+              <a:t>22/05/2022</a:t>
             </a:fld>
             <a:endParaRPr lang="en-GB"/>
           </a:p>
@@ -1350,7 +1350,7 @@
           <a:p>
             <a:fld id="{8BE6B674-AADE-49EF-9780-6CBE5B9EDB57}" type="datetimeFigureOut">
               <a:rPr lang="en-GB" smtClean="0"/>
-              <a:t>21/05/2022</a:t>
+              <a:t>22/05/2022</a:t>
             </a:fld>
             <a:endParaRPr lang="en-GB"/>
           </a:p>
@@ -1625,7 +1625,7 @@
           <a:p>
             <a:fld id="{8BE6B674-AADE-49EF-9780-6CBE5B9EDB57}" type="datetimeFigureOut">
               <a:rPr lang="en-GB" smtClean="0"/>
-              <a:t>21/05/2022</a:t>
+              <a:t>22/05/2022</a:t>
             </a:fld>
             <a:endParaRPr lang="en-GB"/>
           </a:p>
@@ -2004,7 +2004,7 @@
           <a:p>
             <a:fld id="{8BE6B674-AADE-49EF-9780-6CBE5B9EDB57}" type="datetimeFigureOut">
               <a:rPr lang="en-GB" smtClean="0"/>
-              <a:t>21/05/2022</a:t>
+              <a:t>22/05/2022</a:t>
             </a:fld>
             <a:endParaRPr lang="en-GB"/>
           </a:p>
@@ -2122,7 +2122,7 @@
           <a:p>
             <a:fld id="{8BE6B674-AADE-49EF-9780-6CBE5B9EDB57}" type="datetimeFigureOut">
               <a:rPr lang="en-GB" smtClean="0"/>
-              <a:t>21/05/2022</a:t>
+              <a:t>22/05/2022</a:t>
             </a:fld>
             <a:endParaRPr lang="en-GB"/>
           </a:p>
@@ -2293,7 +2293,7 @@
           <a:p>
             <a:fld id="{8BE6B674-AADE-49EF-9780-6CBE5B9EDB57}" type="datetimeFigureOut">
               <a:rPr lang="en-GB" smtClean="0"/>
-              <a:t>21/05/2022</a:t>
+              <a:t>22/05/2022</a:t>
             </a:fld>
             <a:endParaRPr lang="en-GB"/>
           </a:p>
@@ -2647,7 +2647,7 @@
           <a:p>
             <a:fld id="{8BE6B674-AADE-49EF-9780-6CBE5B9EDB57}" type="datetimeFigureOut">
               <a:rPr lang="en-GB" smtClean="0"/>
-              <a:t>21/05/2022</a:t>
+              <a:t>22/05/2022</a:t>
             </a:fld>
             <a:endParaRPr lang="en-GB"/>
           </a:p>
@@ -3029,7 +3029,7 @@
           <a:p>
             <a:fld id="{8BE6B674-AADE-49EF-9780-6CBE5B9EDB57}" type="datetimeFigureOut">
               <a:rPr lang="en-GB" smtClean="0"/>
-              <a:t>21/05/2022</a:t>
+              <a:t>22/05/2022</a:t>
             </a:fld>
             <a:endParaRPr lang="en-GB"/>
           </a:p>
@@ -3316,7 +3316,7 @@
           <a:p>
             <a:fld id="{8BE6B674-AADE-49EF-9780-6CBE5B9EDB57}" type="datetimeFigureOut">
               <a:rPr lang="en-GB" smtClean="0"/>
-              <a:t>21/05/2022</a:t>
+              <a:t>22/05/2022</a:t>
             </a:fld>
             <a:endParaRPr lang="en-GB"/>
           </a:p>
@@ -8283,10 +8283,10 @@
       </p:sp>
       <p:pic>
         <p:nvPicPr>
-          <p:cNvPr id="5" name="Picture 4" descr="Graphical user interface, text, application&#10;&#10;Description automatically generated">
+          <p:cNvPr id="6" name="Picture 5" descr="A picture containing graphical user interface&#10;&#10;Description automatically generated">
             <a:extLst>
               <a:ext uri="{FF2B5EF4-FFF2-40B4-BE49-F238E27FC236}">
-                <a16:creationId xmlns:a16="http://schemas.microsoft.com/office/drawing/2014/main" id="{A8A247D4-D55A-2D2E-9DFD-F16E5FA06B78}"/>
+                <a16:creationId xmlns:a16="http://schemas.microsoft.com/office/drawing/2014/main" id="{E6DDC38A-80C2-3F22-90EE-3A0485A47323}"/>
               </a:ext>
             </a:extLst>
           </p:cNvPr>
@@ -8309,8 +8309,8 @@
         </p:blipFill>
         <p:spPr>
           <a:xfrm>
-            <a:off x="1902435" y="3990999"/>
-            <a:ext cx="8448090" cy="2121536"/>
+            <a:off x="486741" y="4095160"/>
+            <a:ext cx="11218517" cy="1594510"/>
           </a:xfrm>
           <a:prstGeom prst="rect">
             <a:avLst/>

</xml_diff>

<commit_message>
Added bot image to ppt
</commit_message>
<xml_diff>
--- a/Smart Neighborhood.pptx
+++ b/Smart Neighborhood.pptx
@@ -411,7 +411,7 @@
           <a:p>
             <a:fld id="{053125B1-4250-40AD-8036-A38D44547BC7}" type="slidenum">
               <a:rPr lang="en-GB" smtClean="0"/>
-              <a:t>‹N›</a:t>
+              <a:t>‹#›</a:t>
             </a:fld>
             <a:endParaRPr lang="en-GB"/>
           </a:p>
@@ -619,7 +619,7 @@
           <a:p>
             <a:fld id="{053125B1-4250-40AD-8036-A38D44547BC7}" type="slidenum">
               <a:rPr lang="en-GB" smtClean="0"/>
-              <a:t>‹N›</a:t>
+              <a:t>‹#›</a:t>
             </a:fld>
             <a:endParaRPr lang="en-GB"/>
           </a:p>
@@ -875,7 +875,7 @@
           <a:p>
             <a:fld id="{053125B1-4250-40AD-8036-A38D44547BC7}" type="slidenum">
               <a:rPr lang="en-GB" smtClean="0"/>
-              <a:t>‹N›</a:t>
+              <a:t>‹#›</a:t>
             </a:fld>
             <a:endParaRPr lang="en-GB"/>
           </a:p>
@@ -1049,7 +1049,7 @@
           <a:p>
             <a:fld id="{053125B1-4250-40AD-8036-A38D44547BC7}" type="slidenum">
               <a:rPr lang="en-GB" smtClean="0"/>
-              <a:t>‹N›</a:t>
+              <a:t>‹#›</a:t>
             </a:fld>
             <a:endParaRPr lang="en-GB"/>
           </a:p>
@@ -1392,7 +1392,7 @@
           <a:p>
             <a:fld id="{053125B1-4250-40AD-8036-A38D44547BC7}" type="slidenum">
               <a:rPr lang="en-GB" smtClean="0"/>
-              <a:t>‹N›</a:t>
+              <a:t>‹#›</a:t>
             </a:fld>
             <a:endParaRPr lang="en-GB"/>
           </a:p>
@@ -1667,7 +1667,7 @@
           <a:p>
             <a:fld id="{053125B1-4250-40AD-8036-A38D44547BC7}" type="slidenum">
               <a:rPr lang="en-GB" smtClean="0"/>
-              <a:t>‹N›</a:t>
+              <a:t>‹#›</a:t>
             </a:fld>
             <a:endParaRPr lang="en-GB"/>
           </a:p>
@@ -2046,7 +2046,7 @@
           <a:p>
             <a:fld id="{053125B1-4250-40AD-8036-A38D44547BC7}" type="slidenum">
               <a:rPr lang="en-GB" smtClean="0"/>
-              <a:t>‹N›</a:t>
+              <a:t>‹#›</a:t>
             </a:fld>
             <a:endParaRPr lang="en-GB"/>
           </a:p>
@@ -2164,7 +2164,7 @@
           <a:p>
             <a:fld id="{053125B1-4250-40AD-8036-A38D44547BC7}" type="slidenum">
               <a:rPr lang="en-GB" smtClean="0"/>
-              <a:t>‹N›</a:t>
+              <a:t>‹#›</a:t>
             </a:fld>
             <a:endParaRPr lang="en-GB"/>
           </a:p>
@@ -2343,7 +2343,7 @@
           <a:p>
             <a:fld id="{053125B1-4250-40AD-8036-A38D44547BC7}" type="slidenum">
               <a:rPr lang="en-GB" smtClean="0"/>
-              <a:t>‹N›</a:t>
+              <a:t>‹#›</a:t>
             </a:fld>
             <a:endParaRPr lang="en-GB"/>
           </a:p>
@@ -2710,7 +2710,7 @@
           <a:p>
             <a:fld id="{053125B1-4250-40AD-8036-A38D44547BC7}" type="slidenum">
               <a:rPr lang="en-GB" smtClean="0"/>
-              <a:t>‹N›</a:t>
+              <a:t>‹#›</a:t>
             </a:fld>
             <a:endParaRPr lang="en-GB"/>
           </a:p>
@@ -3071,7 +3071,7 @@
           <a:p>
             <a:fld id="{053125B1-4250-40AD-8036-A38D44547BC7}" type="slidenum">
               <a:rPr lang="en-GB" smtClean="0"/>
-              <a:t>‹N›</a:t>
+              <a:t>‹#›</a:t>
             </a:fld>
             <a:endParaRPr lang="en-GB"/>
           </a:p>
@@ -3390,7 +3390,7 @@
           <a:p>
             <a:fld id="{053125B1-4250-40AD-8036-A38D44547BC7}" type="slidenum">
               <a:rPr lang="en-GB" smtClean="0"/>
-              <a:t>‹N›</a:t>
+              <a:t>‹#›</a:t>
             </a:fld>
             <a:endParaRPr lang="en-GB"/>
           </a:p>
@@ -8211,27 +8211,29 @@
         </p:nvSpPr>
         <p:spPr/>
         <p:txBody>
-          <a:bodyPr/>
+          <a:bodyPr>
+            <a:normAutofit/>
+          </a:bodyPr>
           <a:lstStyle/>
           <a:p>
             <a:r>
-              <a:rPr lang="en-GB" dirty="0"/>
+              <a:rPr lang="en-GB" sz="1600" dirty="0"/>
               <a:t>A Telegram bot called </a:t>
             </a:r>
             <a:r>
-              <a:rPr lang="en-GB" i="1" dirty="0" err="1"/>
+              <a:rPr lang="en-GB" sz="1600" i="1" dirty="0" err="1"/>
               <a:t>smart_neighborhood</a:t>
             </a:r>
             <a:r>
-              <a:rPr lang="en-GB" dirty="0"/>
+              <a:rPr lang="en-GB" sz="1600" dirty="0"/>
               <a:t> is used to </a:t>
             </a:r>
             <a:r>
-              <a:rPr lang="en-GB" b="1" dirty="0"/>
+              <a:rPr lang="en-GB" sz="1600" b="1" dirty="0"/>
               <a:t>notify the house’s owners whenever the system decides to move the windows</a:t>
             </a:r>
             <a:r>
-              <a:rPr lang="en-GB" dirty="0"/>
+              <a:rPr lang="en-GB" sz="1600" dirty="0"/>
               <a:t>. The bot has two simple commands:</a:t>
             </a:r>
           </a:p>
@@ -8241,15 +8243,15 @@
               <a:buChar char="•"/>
             </a:pPr>
             <a:r>
-              <a:rPr lang="en-GB" dirty="0"/>
+              <a:rPr lang="en-GB" sz="1600" dirty="0"/>
               <a:t> </a:t>
             </a:r>
             <a:r>
-              <a:rPr lang="en-GB" i="1" dirty="0"/>
+              <a:rPr lang="en-GB" sz="1600" i="1" dirty="0"/>
               <a:t>/start, </a:t>
             </a:r>
             <a:r>
-              <a:rPr lang="en-GB" dirty="0"/>
+              <a:rPr lang="en-GB" sz="1600" dirty="0"/>
               <a:t>that is automatically called when the bot is started, gives a welcome message and store, if new, the user in the database;</a:t>
             </a:r>
           </a:p>
@@ -8259,26 +8261,62 @@
               <a:buChar char="•"/>
             </a:pPr>
             <a:r>
-              <a:rPr lang="en-GB" dirty="0"/>
+              <a:rPr lang="en-GB" sz="1600" dirty="0"/>
               <a:t> </a:t>
             </a:r>
             <a:r>
-              <a:rPr lang="en-GB" i="1" dirty="0"/>
+              <a:rPr lang="en-GB" sz="1600" i="1" dirty="0"/>
               <a:t>/help, </a:t>
             </a:r>
             <a:r>
-              <a:rPr lang="en-GB" dirty="0"/>
+              <a:rPr lang="en-GB" sz="1600" dirty="0"/>
               <a:t>which gives a short description of bot’s functionalities.</a:t>
             </a:r>
           </a:p>
           <a:p>
             <a:r>
-              <a:rPr lang="en-GB" dirty="0"/>
+              <a:rPr lang="en-GB" sz="1600" dirty="0"/>
               <a:t>When the engine decides to move the windows, it calls a specific function of the bot which sends a message to all the chat IDs stored in the database in order to make the owners aware of the new state of their windows. In the message, it is also suggested to use the web app to change the state of the windows if the new state does not match the user’s will.</a:t>
             </a:r>
           </a:p>
         </p:txBody>
       </p:sp>
+      <p:pic>
+        <p:nvPicPr>
+          <p:cNvPr id="5" name="Picture 4" descr="A picture containing graphical user interface&#10;&#10;Description automatically generated">
+            <a:extLst>
+              <a:ext uri="{FF2B5EF4-FFF2-40B4-BE49-F238E27FC236}">
+                <a16:creationId xmlns:a16="http://schemas.microsoft.com/office/drawing/2014/main" id="{555489FC-8AF8-9F3F-356B-348E2290CA5D}"/>
+              </a:ext>
+            </a:extLst>
+          </p:cNvPr>
+          <p:cNvPicPr>
+            <a:picLocks noChangeAspect="1"/>
+          </p:cNvPicPr>
+          <p:nvPr/>
+        </p:nvPicPr>
+        <p:blipFill>
+          <a:blip r:embed="rId2">
+            <a:extLst>
+              <a:ext uri="{28A0092B-C50C-407E-A947-70E740481C1C}">
+                <a14:useLocalDpi xmlns:a14="http://schemas.microsoft.com/office/drawing/2010/main" val="0"/>
+              </a:ext>
+            </a:extLst>
+          </a:blip>
+          <a:stretch>
+            <a:fillRect/>
+          </a:stretch>
+        </p:blipFill>
+        <p:spPr>
+          <a:xfrm>
+            <a:off x="309218" y="4399984"/>
+            <a:ext cx="11573564" cy="1644973"/>
+          </a:xfrm>
+          <a:prstGeom prst="rect">
+            <a:avLst/>
+          </a:prstGeom>
+        </p:spPr>
+      </p:pic>
     </p:spTree>
     <p:extLst>
       <p:ext uri="{BB962C8B-B14F-4D97-AF65-F5344CB8AC3E}">

</xml_diff>